<commit_message>
Updated autonomous and vision.
</commit_message>
<xml_diff>
--- a/Lessons/7-Autonomous.pptx
+++ b/Lessons/7-Autonomous.pptx
@@ -5,7 +5,7 @@
     <p:sldMasterId id="2147483648" r:id="rId1"/>
   </p:sldMasterIdLst>
   <p:notesMasterIdLst>
-    <p:notesMasterId r:id="rId12"/>
+    <p:notesMasterId r:id="rId16"/>
   </p:notesMasterIdLst>
   <p:sldIdLst>
     <p:sldId id="266" r:id="rId2"/>
@@ -17,7 +17,11 @@
     <p:sldId id="276" r:id="rId8"/>
     <p:sldId id="305" r:id="rId9"/>
     <p:sldId id="285" r:id="rId10"/>
-    <p:sldId id="293" r:id="rId11"/>
+    <p:sldId id="282" r:id="rId11"/>
+    <p:sldId id="310" r:id="rId12"/>
+    <p:sldId id="287" r:id="rId13"/>
+    <p:sldId id="288" r:id="rId14"/>
+    <p:sldId id="293" r:id="rId15"/>
   </p:sldIdLst>
   <p:sldSz cx="12192000" cy="6858000"/>
   <p:notesSz cx="6858000" cy="9144000"/>
@@ -206,7 +210,7 @@
           <a:p>
             <a:fld id="{88DFE0DC-517A-40C1-B3B1-8C641051689B}" type="datetimeFigureOut">
               <a:rPr lang="en-US" smtClean="0"/>
-              <a:t>8/7/2023</a:t>
+              <a:t>8/8/2023</a:t>
             </a:fld>
             <a:endParaRPr lang="en-US"/>
           </a:p>
@@ -893,7 +897,7 @@
             <a:fld id="{5923F103-BC34-4FE4-A40E-EDDEECFDA5D0}" type="datetimeFigureOut">
               <a:rPr lang="en-US" dirty="0"/>
               <a:pPr/>
-              <a:t>8/7/2023</a:t>
+              <a:t>8/8/2023</a:t>
             </a:fld>
             <a:endParaRPr lang="en-US" dirty="0"/>
           </a:p>
@@ -1977,7 +1981,7 @@
           <a:p>
             <a:fld id="{923A1CC3-2375-41D4-9E03-427CAF2A4C1A}" type="datetimeFigureOut">
               <a:rPr lang="en-US" dirty="0"/>
-              <a:t>8/7/2023</a:t>
+              <a:t>8/8/2023</a:t>
             </a:fld>
             <a:endParaRPr lang="en-US" dirty="0"/>
           </a:p>
@@ -2953,7 +2957,7 @@
           <a:p>
             <a:fld id="{AFF16868-8199-4C2C-A5B1-63AEE139F88E}" type="datetimeFigureOut">
               <a:rPr lang="en-US" dirty="0"/>
-              <a:t>8/7/2023</a:t>
+              <a:t>8/8/2023</a:t>
             </a:fld>
             <a:endParaRPr lang="en-US" dirty="0"/>
           </a:p>
@@ -4083,7 +4087,7 @@
           <a:p>
             <a:fld id="{AAD9FF7F-6988-44CC-821B-644E70CD2F73}" type="datetimeFigureOut">
               <a:rPr lang="en-US" dirty="0"/>
-              <a:t>8/7/2023</a:t>
+              <a:t>8/8/2023</a:t>
             </a:fld>
             <a:endParaRPr lang="en-US" dirty="0"/>
           </a:p>
@@ -5112,7 +5116,7 @@
           <a:p>
             <a:fld id="{5C12C299-16B2-4475-990D-751901EACC14}" type="datetimeFigureOut">
               <a:rPr lang="en-US" dirty="0"/>
-              <a:t>8/7/2023</a:t>
+              <a:t>8/8/2023</a:t>
             </a:fld>
             <a:endParaRPr lang="en-US" dirty="0"/>
           </a:p>
@@ -5768,7 +5772,7 @@
           <a:p>
             <a:fld id="{9FE86839-B9D8-4651-8783-F325ECE74E65}" type="datetimeFigureOut">
               <a:rPr lang="en-US" dirty="0"/>
-              <a:t>8/7/2023</a:t>
+              <a:t>8/8/2023</a:t>
             </a:fld>
             <a:endParaRPr lang="en-US" dirty="0"/>
           </a:p>
@@ -6625,7 +6629,7 @@
           <a:p>
             <a:fld id="{FD484F64-32F6-45C5-931F-ADC1662401D0}" type="datetimeFigureOut">
               <a:rPr lang="en-US" dirty="0"/>
-              <a:t>8/7/2023</a:t>
+              <a:t>8/8/2023</a:t>
             </a:fld>
             <a:endParaRPr lang="en-US" dirty="0"/>
           </a:p>
@@ -6811,7 +6815,7 @@
           <a:p>
             <a:fld id="{53086D93-FCAC-47E0-A2EE-787E62CA814C}" type="datetimeFigureOut">
               <a:rPr lang="en-US" dirty="0"/>
-              <a:t>8/7/2023</a:t>
+              <a:t>8/8/2023</a:t>
             </a:fld>
             <a:endParaRPr lang="en-US" dirty="0"/>
           </a:p>
@@ -7779,7 +7783,7 @@
           <a:p>
             <a:fld id="{CDA879A6-0FD0-4734-A311-86BFCA472E6E}" type="datetimeFigureOut">
               <a:rPr lang="en-US" dirty="0"/>
-              <a:t>8/7/2023</a:t>
+              <a:t>8/8/2023</a:t>
             </a:fld>
             <a:endParaRPr lang="en-US" dirty="0"/>
           </a:p>
@@ -7986,7 +7990,7 @@
           <a:p>
             <a:fld id="{19C9CA7B-DFD4-44B5-8C60-D14B8CD1FB59}" type="datetimeFigureOut">
               <a:rPr lang="en-US" dirty="0"/>
-              <a:t>8/7/2023</a:t>
+              <a:t>8/8/2023</a:t>
             </a:fld>
             <a:endParaRPr lang="en-US" dirty="0"/>
           </a:p>
@@ -9016,7 +9020,7 @@
           <a:p>
             <a:fld id="{F34E6425-0181-43F2-84FC-787E803FD2F8}" type="datetimeFigureOut">
               <a:rPr lang="en-US" dirty="0"/>
-              <a:t>8/7/2023</a:t>
+              <a:t>8/8/2023</a:t>
             </a:fld>
             <a:endParaRPr lang="en-US" dirty="0"/>
           </a:p>
@@ -9284,7 +9288,7 @@
           <a:p>
             <a:fld id="{3BDB8791-F1B0-41E7-B7FD-A781E65C4266}" type="datetimeFigureOut">
               <a:rPr lang="en-US" dirty="0"/>
-              <a:t>8/7/2023</a:t>
+              <a:t>8/8/2023</a:t>
             </a:fld>
             <a:endParaRPr lang="en-US" dirty="0"/>
           </a:p>
@@ -9690,7 +9694,7 @@
           <a:p>
             <a:fld id="{5FDD63B2-E120-4ED8-B27B-C685F510A5FE}" type="datetimeFigureOut">
               <a:rPr lang="en-US" dirty="0"/>
-              <a:t>8/7/2023</a:t>
+              <a:t>8/8/2023</a:t>
             </a:fld>
             <a:endParaRPr lang="en-US" dirty="0"/>
           </a:p>
@@ -9813,7 +9817,7 @@
           <a:p>
             <a:fld id="{7AA18ACC-A947-437B-A130-35BD54FDF1E9}" type="datetimeFigureOut">
               <a:rPr lang="en-US" dirty="0"/>
-              <a:t>8/7/2023</a:t>
+              <a:t>8/8/2023</a:t>
             </a:fld>
             <a:endParaRPr lang="en-US" dirty="0"/>
           </a:p>
@@ -9904,7 +9908,7 @@
           <a:p>
             <a:fld id="{7C8D7E02-BCB8-4D50-A234-369438C08659}" type="datetimeFigureOut">
               <a:rPr lang="en-US" dirty="0"/>
-              <a:t>8/7/2023</a:t>
+              <a:t>8/8/2023</a:t>
             </a:fld>
             <a:endParaRPr lang="en-US" dirty="0"/>
           </a:p>
@@ -10981,7 +10985,7 @@
           <a:p>
             <a:fld id="{76E86A4C-8E40-4F87-A4F0-01A0687C5742}" type="datetimeFigureOut">
               <a:rPr lang="en-US" dirty="0"/>
-              <a:t>8/7/2023</a:t>
+              <a:t>8/8/2023</a:t>
             </a:fld>
             <a:endParaRPr lang="en-US" dirty="0"/>
           </a:p>
@@ -12085,7 +12089,7 @@
           <a:p>
             <a:fld id="{35E72C73-2D91-4E12-BA25-F0AA0C03599B}" type="datetimeFigureOut">
               <a:rPr lang="en-US" dirty="0"/>
-              <a:t>8/7/2023</a:t>
+              <a:t>8/8/2023</a:t>
             </a:fld>
             <a:endParaRPr lang="en-US" dirty="0"/>
           </a:p>
@@ -13078,7 +13082,7 @@
           <a:p>
             <a:fld id="{2BE451C3-0FF4-47C4-B829-773ADF60F88C}" type="datetimeFigureOut">
               <a:rPr lang="en-US" dirty="0"/>
-              <a:t>8/7/2023</a:t>
+              <a:t>8/8/2023</a:t>
             </a:fld>
             <a:endParaRPr lang="en-US" dirty="0"/>
           </a:p>
@@ -13759,6 +13763,1519 @@
             <p:ph type="title"/>
           </p:nvPr>
         </p:nvSpPr>
+        <p:spPr/>
+        <p:txBody>
+          <a:bodyPr/>
+          <a:lstStyle/>
+          <a:p>
+            <a:r>
+              <a:rPr lang="en-US" dirty="0"/>
+              <a:t>Timer</a:t>
+            </a:r>
+          </a:p>
+        </p:txBody>
+      </p:sp>
+      <p:sp>
+        <p:nvSpPr>
+          <p:cNvPr id="3" name="Content Placeholder 2">
+            <a:extLst>
+              <a:ext uri="{FF2B5EF4-FFF2-40B4-BE49-F238E27FC236}">
+                <a16:creationId xmlns:a16="http://schemas.microsoft.com/office/drawing/2014/main" id="{FCEC0B1B-EF9F-41D7-A2C0-35A72C57C987}"/>
+              </a:ext>
+            </a:extLst>
+          </p:cNvPr>
+          <p:cNvSpPr>
+            <a:spLocks noGrp="1"/>
+          </p:cNvSpPr>
+          <p:nvPr>
+            <p:ph idx="1"/>
+          </p:nvPr>
+        </p:nvSpPr>
+        <p:spPr>
+          <a:xfrm>
+            <a:off x="588936" y="2286000"/>
+            <a:ext cx="11030918" cy="4510007"/>
+          </a:xfrm>
+        </p:spPr>
+        <p:txBody>
+          <a:bodyPr>
+            <a:normAutofit/>
+          </a:bodyPr>
+          <a:lstStyle/>
+          <a:p>
+            <a:r>
+              <a:rPr lang="en-US" dirty="0"/>
+              <a:t>From time to time, the robot needs a timing mechanism, waiting for a given period of time to past.</a:t>
+            </a:r>
+          </a:p>
+          <a:p>
+            <a:r>
+              <a:rPr lang="en-US" dirty="0" err="1"/>
+              <a:t>TrcTimer</a:t>
+            </a:r>
+            <a:r>
+              <a:rPr lang="en-US" dirty="0"/>
+              <a:t> Constructor: </a:t>
+            </a:r>
+            <a:r>
+              <a:rPr lang="en-US" b="0" dirty="0" err="1">
+                <a:solidFill>
+                  <a:srgbClr val="DCDCAA"/>
+                </a:solidFill>
+                <a:effectLst/>
+                <a:latin typeface="Consolas" panose="020B0609020204030204" pitchFamily="49" charset="0"/>
+              </a:rPr>
+              <a:t>TrcTimer</a:t>
+            </a:r>
+            <a:r>
+              <a:rPr lang="en-US" b="0" dirty="0">
+                <a:solidFill>
+                  <a:srgbClr val="D4D4D4"/>
+                </a:solidFill>
+                <a:effectLst/>
+                <a:latin typeface="Consolas" panose="020B0609020204030204" pitchFamily="49" charset="0"/>
+              </a:rPr>
+              <a:t>(</a:t>
+            </a:r>
+            <a:r>
+              <a:rPr lang="en-US" b="0" dirty="0">
+                <a:solidFill>
+                  <a:srgbClr val="4EC9B0"/>
+                </a:solidFill>
+                <a:effectLst/>
+                <a:latin typeface="Consolas" panose="020B0609020204030204" pitchFamily="49" charset="0"/>
+              </a:rPr>
+              <a:t>String</a:t>
+            </a:r>
+            <a:r>
+              <a:rPr lang="en-US" b="0" dirty="0">
+                <a:solidFill>
+                  <a:srgbClr val="D4D4D4"/>
+                </a:solidFill>
+                <a:effectLst/>
+                <a:latin typeface="Consolas" panose="020B0609020204030204" pitchFamily="49" charset="0"/>
+              </a:rPr>
+              <a:t> </a:t>
+            </a:r>
+            <a:r>
+              <a:rPr lang="en-US" b="0" dirty="0" err="1">
+                <a:solidFill>
+                  <a:srgbClr val="9CDCFE"/>
+                </a:solidFill>
+                <a:effectLst/>
+                <a:latin typeface="Consolas" panose="020B0609020204030204" pitchFamily="49" charset="0"/>
+              </a:rPr>
+              <a:t>instanceName</a:t>
+            </a:r>
+            <a:r>
+              <a:rPr lang="en-US" b="0" dirty="0">
+                <a:solidFill>
+                  <a:srgbClr val="D4D4D4"/>
+                </a:solidFill>
+                <a:effectLst/>
+                <a:latin typeface="Consolas" panose="020B0609020204030204" pitchFamily="49" charset="0"/>
+              </a:rPr>
+              <a:t>)</a:t>
+            </a:r>
+            <a:endParaRPr lang="en-US" dirty="0"/>
+          </a:p>
+          <a:p>
+            <a:r>
+              <a:rPr lang="en-US" dirty="0"/>
+              <a:t>Methods:</a:t>
+            </a:r>
+          </a:p>
+          <a:p>
+            <a:pPr lvl="1"/>
+            <a:r>
+              <a:rPr lang="en-US" b="0" dirty="0">
+                <a:solidFill>
+                  <a:srgbClr val="4EC9B0"/>
+                </a:solidFill>
+                <a:effectLst/>
+                <a:latin typeface="Consolas" panose="020B0609020204030204" pitchFamily="49" charset="0"/>
+              </a:rPr>
+              <a:t>void</a:t>
+            </a:r>
+            <a:r>
+              <a:rPr lang="en-US" b="0" dirty="0">
+                <a:solidFill>
+                  <a:srgbClr val="D4D4D4"/>
+                </a:solidFill>
+                <a:effectLst/>
+                <a:latin typeface="Consolas" panose="020B0609020204030204" pitchFamily="49" charset="0"/>
+              </a:rPr>
+              <a:t> </a:t>
+            </a:r>
+            <a:r>
+              <a:rPr lang="en-US" b="0" dirty="0">
+                <a:solidFill>
+                  <a:srgbClr val="DCDCAA"/>
+                </a:solidFill>
+                <a:effectLst/>
+                <a:latin typeface="Consolas" panose="020B0609020204030204" pitchFamily="49" charset="0"/>
+              </a:rPr>
+              <a:t>set</a:t>
+            </a:r>
+            <a:r>
+              <a:rPr lang="en-US" b="0" dirty="0">
+                <a:solidFill>
+                  <a:srgbClr val="D4D4D4"/>
+                </a:solidFill>
+                <a:effectLst/>
+                <a:latin typeface="Consolas" panose="020B0609020204030204" pitchFamily="49" charset="0"/>
+              </a:rPr>
+              <a:t>(</a:t>
+            </a:r>
+            <a:r>
+              <a:rPr lang="en-US" b="0" dirty="0">
+                <a:solidFill>
+                  <a:srgbClr val="4EC9B0"/>
+                </a:solidFill>
+                <a:effectLst/>
+                <a:latin typeface="Consolas" panose="020B0609020204030204" pitchFamily="49" charset="0"/>
+              </a:rPr>
+              <a:t>double</a:t>
+            </a:r>
+            <a:r>
+              <a:rPr lang="en-US" b="0" dirty="0">
+                <a:solidFill>
+                  <a:srgbClr val="D4D4D4"/>
+                </a:solidFill>
+                <a:effectLst/>
+                <a:latin typeface="Consolas" panose="020B0609020204030204" pitchFamily="49" charset="0"/>
+              </a:rPr>
+              <a:t> </a:t>
+            </a:r>
+            <a:r>
+              <a:rPr lang="en-US" b="0" dirty="0">
+                <a:solidFill>
+                  <a:srgbClr val="9CDCFE"/>
+                </a:solidFill>
+                <a:effectLst/>
+                <a:latin typeface="Consolas" panose="020B0609020204030204" pitchFamily="49" charset="0"/>
+              </a:rPr>
+              <a:t>time</a:t>
+            </a:r>
+            <a:r>
+              <a:rPr lang="en-US" b="0" dirty="0">
+                <a:solidFill>
+                  <a:srgbClr val="D4D4D4"/>
+                </a:solidFill>
+                <a:effectLst/>
+                <a:latin typeface="Consolas" panose="020B0609020204030204" pitchFamily="49" charset="0"/>
+              </a:rPr>
+              <a:t>, </a:t>
+            </a:r>
+            <a:r>
+              <a:rPr lang="en-US" b="0" dirty="0" err="1">
+                <a:solidFill>
+                  <a:srgbClr val="4EC9B0"/>
+                </a:solidFill>
+                <a:effectLst/>
+                <a:latin typeface="Consolas" panose="020B0609020204030204" pitchFamily="49" charset="0"/>
+              </a:rPr>
+              <a:t>TrcEvent</a:t>
+            </a:r>
+            <a:r>
+              <a:rPr lang="en-US" b="0" dirty="0">
+                <a:solidFill>
+                  <a:srgbClr val="D4D4D4"/>
+                </a:solidFill>
+                <a:effectLst/>
+                <a:latin typeface="Consolas" panose="020B0609020204030204" pitchFamily="49" charset="0"/>
+              </a:rPr>
+              <a:t> </a:t>
+            </a:r>
+            <a:r>
+              <a:rPr lang="en-US" b="0" dirty="0">
+                <a:solidFill>
+                  <a:srgbClr val="9CDCFE"/>
+                </a:solidFill>
+                <a:effectLst/>
+                <a:latin typeface="Consolas" panose="020B0609020204030204" pitchFamily="49" charset="0"/>
+              </a:rPr>
+              <a:t>event</a:t>
+            </a:r>
+            <a:r>
+              <a:rPr lang="en-US" b="0" dirty="0">
+                <a:solidFill>
+                  <a:srgbClr val="D4D4D4"/>
+                </a:solidFill>
+                <a:effectLst/>
+                <a:latin typeface="Consolas" panose="020B0609020204030204" pitchFamily="49" charset="0"/>
+              </a:rPr>
+              <a:t>)</a:t>
+            </a:r>
+            <a:r>
+              <a:rPr lang="en-US" dirty="0"/>
+              <a:t> – starts a timer that will signal an event when the specified time has expired.</a:t>
+            </a:r>
+          </a:p>
+          <a:p>
+            <a:pPr lvl="1"/>
+            <a:r>
+              <a:rPr lang="en-US" b="0" dirty="0">
+                <a:solidFill>
+                  <a:srgbClr val="4EC9B0"/>
+                </a:solidFill>
+                <a:effectLst/>
+                <a:latin typeface="Consolas" panose="020B0609020204030204" pitchFamily="49" charset="0"/>
+              </a:rPr>
+              <a:t>void</a:t>
+            </a:r>
+            <a:r>
+              <a:rPr lang="en-US" b="0" dirty="0">
+                <a:solidFill>
+                  <a:srgbClr val="D4D4D4"/>
+                </a:solidFill>
+                <a:effectLst/>
+                <a:latin typeface="Consolas" panose="020B0609020204030204" pitchFamily="49" charset="0"/>
+              </a:rPr>
+              <a:t> </a:t>
+            </a:r>
+            <a:r>
+              <a:rPr lang="en-US" b="0" dirty="0">
+                <a:solidFill>
+                  <a:srgbClr val="DCDCAA"/>
+                </a:solidFill>
+                <a:effectLst/>
+                <a:latin typeface="Consolas" panose="020B0609020204030204" pitchFamily="49" charset="0"/>
+              </a:rPr>
+              <a:t>set</a:t>
+            </a:r>
+            <a:r>
+              <a:rPr lang="en-US" b="0" dirty="0">
+                <a:solidFill>
+                  <a:srgbClr val="D4D4D4"/>
+                </a:solidFill>
+                <a:effectLst/>
+                <a:latin typeface="Consolas" panose="020B0609020204030204" pitchFamily="49" charset="0"/>
+              </a:rPr>
+              <a:t>(</a:t>
+            </a:r>
+            <a:r>
+              <a:rPr lang="en-US" b="0" dirty="0">
+                <a:solidFill>
+                  <a:srgbClr val="4EC9B0"/>
+                </a:solidFill>
+                <a:effectLst/>
+                <a:latin typeface="Consolas" panose="020B0609020204030204" pitchFamily="49" charset="0"/>
+              </a:rPr>
+              <a:t>double</a:t>
+            </a:r>
+            <a:r>
+              <a:rPr lang="en-US" b="0" dirty="0">
+                <a:solidFill>
+                  <a:srgbClr val="D4D4D4"/>
+                </a:solidFill>
+                <a:effectLst/>
+                <a:latin typeface="Consolas" panose="020B0609020204030204" pitchFamily="49" charset="0"/>
+              </a:rPr>
+              <a:t> </a:t>
+            </a:r>
+            <a:r>
+              <a:rPr lang="en-US" b="0" dirty="0">
+                <a:solidFill>
+                  <a:srgbClr val="9CDCFE"/>
+                </a:solidFill>
+                <a:effectLst/>
+                <a:latin typeface="Consolas" panose="020B0609020204030204" pitchFamily="49" charset="0"/>
+              </a:rPr>
+              <a:t>time</a:t>
+            </a:r>
+            <a:r>
+              <a:rPr lang="en-US" b="0" dirty="0">
+                <a:solidFill>
+                  <a:srgbClr val="D4D4D4"/>
+                </a:solidFill>
+                <a:effectLst/>
+                <a:latin typeface="Consolas" panose="020B0609020204030204" pitchFamily="49" charset="0"/>
+              </a:rPr>
+              <a:t>, </a:t>
+            </a:r>
+            <a:r>
+              <a:rPr lang="en-US" b="0" dirty="0" err="1">
+                <a:solidFill>
+                  <a:srgbClr val="4EC9B0"/>
+                </a:solidFill>
+                <a:effectLst/>
+                <a:latin typeface="Consolas" panose="020B0609020204030204" pitchFamily="49" charset="0"/>
+              </a:rPr>
+              <a:t>TrcEvent</a:t>
+            </a:r>
+            <a:r>
+              <a:rPr lang="en-US" b="0" dirty="0" err="1">
+                <a:solidFill>
+                  <a:srgbClr val="D4D4D4"/>
+                </a:solidFill>
+                <a:effectLst/>
+                <a:latin typeface="Consolas" panose="020B0609020204030204" pitchFamily="49" charset="0"/>
+              </a:rPr>
+              <a:t>.</a:t>
+            </a:r>
+            <a:r>
+              <a:rPr lang="en-US" b="0" dirty="0" err="1">
+                <a:solidFill>
+                  <a:srgbClr val="4EC9B0"/>
+                </a:solidFill>
+                <a:effectLst/>
+                <a:latin typeface="Consolas" panose="020B0609020204030204" pitchFamily="49" charset="0"/>
+              </a:rPr>
+              <a:t>Callback</a:t>
+            </a:r>
+            <a:r>
+              <a:rPr lang="en-US" b="0" dirty="0">
+                <a:solidFill>
+                  <a:srgbClr val="D4D4D4"/>
+                </a:solidFill>
+                <a:effectLst/>
+                <a:latin typeface="Consolas" panose="020B0609020204030204" pitchFamily="49" charset="0"/>
+              </a:rPr>
+              <a:t> </a:t>
+            </a:r>
+            <a:r>
+              <a:rPr lang="en-US" b="0" dirty="0">
+                <a:solidFill>
+                  <a:srgbClr val="9CDCFE"/>
+                </a:solidFill>
+                <a:effectLst/>
+                <a:latin typeface="Consolas" panose="020B0609020204030204" pitchFamily="49" charset="0"/>
+              </a:rPr>
+              <a:t>callback</a:t>
+            </a:r>
+            <a:r>
+              <a:rPr lang="en-US" b="0" dirty="0">
+                <a:solidFill>
+                  <a:srgbClr val="D4D4D4"/>
+                </a:solidFill>
+                <a:effectLst/>
+                <a:latin typeface="Consolas" panose="020B0609020204030204" pitchFamily="49" charset="0"/>
+              </a:rPr>
+              <a:t>, </a:t>
+            </a:r>
+            <a:r>
+              <a:rPr lang="en-US" b="0" dirty="0">
+                <a:solidFill>
+                  <a:srgbClr val="4EC9B0"/>
+                </a:solidFill>
+                <a:effectLst/>
+                <a:latin typeface="Consolas" panose="020B0609020204030204" pitchFamily="49" charset="0"/>
+              </a:rPr>
+              <a:t>Object</a:t>
+            </a:r>
+            <a:r>
+              <a:rPr lang="en-US" b="0" dirty="0">
+                <a:solidFill>
+                  <a:srgbClr val="D4D4D4"/>
+                </a:solidFill>
+                <a:effectLst/>
+                <a:latin typeface="Consolas" panose="020B0609020204030204" pitchFamily="49" charset="0"/>
+              </a:rPr>
+              <a:t> </a:t>
+            </a:r>
+            <a:r>
+              <a:rPr lang="en-US" b="0" dirty="0" err="1">
+                <a:solidFill>
+                  <a:srgbClr val="9CDCFE"/>
+                </a:solidFill>
+                <a:effectLst/>
+                <a:latin typeface="Consolas" panose="020B0609020204030204" pitchFamily="49" charset="0"/>
+              </a:rPr>
+              <a:t>callbackContext</a:t>
+            </a:r>
+            <a:r>
+              <a:rPr lang="en-US" b="0" dirty="0">
+                <a:solidFill>
+                  <a:srgbClr val="D4D4D4"/>
+                </a:solidFill>
+                <a:effectLst/>
+                <a:latin typeface="Consolas" panose="020B0609020204030204" pitchFamily="49" charset="0"/>
+              </a:rPr>
+              <a:t>)</a:t>
+            </a:r>
+            <a:r>
+              <a:rPr lang="en-US" dirty="0"/>
+              <a:t> – starts a timer that will call the specified callback method when the specified time has expired.</a:t>
+            </a:r>
+          </a:p>
+          <a:p>
+            <a:pPr lvl="1"/>
+            <a:r>
+              <a:rPr lang="en-US" b="0" dirty="0">
+                <a:solidFill>
+                  <a:srgbClr val="4EC9B0"/>
+                </a:solidFill>
+                <a:effectLst/>
+                <a:latin typeface="Consolas" panose="020B0609020204030204" pitchFamily="49" charset="0"/>
+              </a:rPr>
+              <a:t>void</a:t>
+            </a:r>
+            <a:r>
+              <a:rPr lang="en-US" b="0" dirty="0">
+                <a:solidFill>
+                  <a:srgbClr val="D4D4D4"/>
+                </a:solidFill>
+                <a:effectLst/>
+                <a:latin typeface="Consolas" panose="020B0609020204030204" pitchFamily="49" charset="0"/>
+              </a:rPr>
+              <a:t> </a:t>
+            </a:r>
+            <a:r>
+              <a:rPr lang="en-US" b="0" dirty="0">
+                <a:solidFill>
+                  <a:srgbClr val="DCDCAA"/>
+                </a:solidFill>
+                <a:effectLst/>
+                <a:latin typeface="Consolas" panose="020B0609020204030204" pitchFamily="49" charset="0"/>
+              </a:rPr>
+              <a:t>cancel</a:t>
+            </a:r>
+            <a:r>
+              <a:rPr lang="en-US" b="0" dirty="0">
+                <a:solidFill>
+                  <a:srgbClr val="D4D4D4"/>
+                </a:solidFill>
+                <a:effectLst/>
+                <a:latin typeface="Consolas" panose="020B0609020204030204" pitchFamily="49" charset="0"/>
+              </a:rPr>
+              <a:t>()</a:t>
+            </a:r>
+            <a:r>
+              <a:rPr lang="en-US" dirty="0"/>
+              <a:t> – cancels an active timer.</a:t>
+            </a:r>
+            <a:endParaRPr lang="en-US" b="0" dirty="0">
+              <a:solidFill>
+                <a:srgbClr val="D4D4D4"/>
+              </a:solidFill>
+              <a:effectLst/>
+              <a:latin typeface="Consolas" panose="020B0609020204030204" pitchFamily="49" charset="0"/>
+            </a:endParaRPr>
+          </a:p>
+          <a:p>
+            <a:pPr lvl="1"/>
+            <a:r>
+              <a:rPr lang="en-US" b="0" dirty="0" err="1">
+                <a:solidFill>
+                  <a:srgbClr val="4EC9B0"/>
+                </a:solidFill>
+                <a:effectLst/>
+                <a:latin typeface="Consolas" panose="020B0609020204030204" pitchFamily="49" charset="0"/>
+              </a:rPr>
+              <a:t>boolean</a:t>
+            </a:r>
+            <a:r>
+              <a:rPr lang="en-US" b="0" dirty="0">
+                <a:solidFill>
+                  <a:srgbClr val="D4D4D4"/>
+                </a:solidFill>
+                <a:effectLst/>
+                <a:latin typeface="Consolas" panose="020B0609020204030204" pitchFamily="49" charset="0"/>
+              </a:rPr>
+              <a:t> </a:t>
+            </a:r>
+            <a:r>
+              <a:rPr lang="en-US" b="0" dirty="0" err="1">
+                <a:solidFill>
+                  <a:srgbClr val="DCDCAA"/>
+                </a:solidFill>
+                <a:effectLst/>
+                <a:latin typeface="Consolas" panose="020B0609020204030204" pitchFamily="49" charset="0"/>
+              </a:rPr>
+              <a:t>hasExpired</a:t>
+            </a:r>
+            <a:r>
+              <a:rPr lang="en-US" b="0" dirty="0">
+                <a:solidFill>
+                  <a:srgbClr val="D4D4D4"/>
+                </a:solidFill>
+                <a:effectLst/>
+                <a:latin typeface="Consolas" panose="020B0609020204030204" pitchFamily="49" charset="0"/>
+              </a:rPr>
+              <a:t>()</a:t>
+            </a:r>
+            <a:r>
+              <a:rPr lang="en-US" dirty="0"/>
+              <a:t> – checks if the timer has expired.</a:t>
+            </a:r>
+            <a:endParaRPr lang="en-US" b="0" dirty="0">
+              <a:solidFill>
+                <a:srgbClr val="D4D4D4"/>
+              </a:solidFill>
+              <a:effectLst/>
+              <a:latin typeface="Consolas" panose="020B0609020204030204" pitchFamily="49" charset="0"/>
+            </a:endParaRPr>
+          </a:p>
+          <a:p>
+            <a:pPr lvl="1"/>
+            <a:r>
+              <a:rPr lang="en-US" b="0" dirty="0" err="1">
+                <a:solidFill>
+                  <a:srgbClr val="4EC9B0"/>
+                </a:solidFill>
+                <a:effectLst/>
+                <a:latin typeface="Consolas" panose="020B0609020204030204" pitchFamily="49" charset="0"/>
+              </a:rPr>
+              <a:t>boolean</a:t>
+            </a:r>
+            <a:r>
+              <a:rPr lang="en-US" b="0" dirty="0">
+                <a:solidFill>
+                  <a:srgbClr val="D4D4D4"/>
+                </a:solidFill>
+                <a:effectLst/>
+                <a:latin typeface="Consolas" panose="020B0609020204030204" pitchFamily="49" charset="0"/>
+              </a:rPr>
+              <a:t> </a:t>
+            </a:r>
+            <a:r>
+              <a:rPr lang="en-US" b="0" dirty="0" err="1">
+                <a:solidFill>
+                  <a:srgbClr val="DCDCAA"/>
+                </a:solidFill>
+                <a:effectLst/>
+                <a:latin typeface="Consolas" panose="020B0609020204030204" pitchFamily="49" charset="0"/>
+              </a:rPr>
+              <a:t>isCanceled</a:t>
+            </a:r>
+            <a:r>
+              <a:rPr lang="en-US" b="0" dirty="0">
+                <a:solidFill>
+                  <a:srgbClr val="D4D4D4"/>
+                </a:solidFill>
+                <a:effectLst/>
+                <a:latin typeface="Consolas" panose="020B0609020204030204" pitchFamily="49" charset="0"/>
+              </a:rPr>
+              <a:t>()</a:t>
+            </a:r>
+            <a:r>
+              <a:rPr lang="en-US" dirty="0"/>
+              <a:t> – checks if the timer was canceled.</a:t>
+            </a:r>
+          </a:p>
+          <a:p>
+            <a:pPr lvl="1"/>
+            <a:r>
+              <a:rPr lang="en-US" b="0" dirty="0" err="1">
+                <a:solidFill>
+                  <a:srgbClr val="4EC9B0"/>
+                </a:solidFill>
+                <a:effectLst/>
+                <a:latin typeface="Consolas" panose="020B0609020204030204" pitchFamily="49" charset="0"/>
+              </a:rPr>
+              <a:t>boolean</a:t>
+            </a:r>
+            <a:r>
+              <a:rPr lang="en-US" b="0" dirty="0">
+                <a:solidFill>
+                  <a:srgbClr val="D4D4D4"/>
+                </a:solidFill>
+                <a:effectLst/>
+                <a:latin typeface="Consolas" panose="020B0609020204030204" pitchFamily="49" charset="0"/>
+              </a:rPr>
+              <a:t> </a:t>
+            </a:r>
+            <a:r>
+              <a:rPr lang="en-US" b="0" dirty="0" err="1">
+                <a:solidFill>
+                  <a:srgbClr val="DCDCAA"/>
+                </a:solidFill>
+                <a:effectLst/>
+                <a:latin typeface="Consolas" panose="020B0609020204030204" pitchFamily="49" charset="0"/>
+              </a:rPr>
+              <a:t>isActive</a:t>
+            </a:r>
+            <a:r>
+              <a:rPr lang="en-US" b="0" dirty="0">
+                <a:solidFill>
+                  <a:srgbClr val="D4D4D4"/>
+                </a:solidFill>
+                <a:effectLst/>
+                <a:latin typeface="Consolas" panose="020B0609020204030204" pitchFamily="49" charset="0"/>
+              </a:rPr>
+              <a:t>()</a:t>
+            </a:r>
+            <a:r>
+              <a:rPr lang="en-US" dirty="0"/>
+              <a:t> – checks if the timer is still active (not expired and not canceled).</a:t>
+            </a:r>
+          </a:p>
+        </p:txBody>
+      </p:sp>
+    </p:spTree>
+    <p:extLst>
+      <p:ext uri="{BB962C8B-B14F-4D97-AF65-F5344CB8AC3E}">
+        <p14:creationId xmlns:p14="http://schemas.microsoft.com/office/powerpoint/2010/main" val="3956206454"/>
+      </p:ext>
+    </p:extLst>
+  </p:cSld>
+  <p:clrMapOvr>
+    <a:masterClrMapping/>
+  </p:clrMapOvr>
+</p:sld>
+</file>
+
+<file path=ppt/slides/slide11.xml><?xml version="1.0" encoding="utf-8"?>
+<p:sld xmlns:a="http://schemas.openxmlformats.org/drawingml/2006/main" xmlns:r="http://schemas.openxmlformats.org/officeDocument/2006/relationships" xmlns:p="http://schemas.openxmlformats.org/presentationml/2006/main">
+  <p:cSld>
+    <p:spTree>
+      <p:nvGrpSpPr>
+        <p:cNvPr id="1" name=""/>
+        <p:cNvGrpSpPr/>
+        <p:nvPr/>
+      </p:nvGrpSpPr>
+      <p:grpSpPr>
+        <a:xfrm>
+          <a:off x="0" y="0"/>
+          <a:ext cx="0" cy="0"/>
+          <a:chOff x="0" y="0"/>
+          <a:chExt cx="0" cy="0"/>
+        </a:xfrm>
+      </p:grpSpPr>
+      <p:sp>
+        <p:nvSpPr>
+          <p:cNvPr id="2" name="Title 1">
+            <a:extLst>
+              <a:ext uri="{FF2B5EF4-FFF2-40B4-BE49-F238E27FC236}">
+                <a16:creationId xmlns:a16="http://schemas.microsoft.com/office/drawing/2014/main" id="{0621DCB2-27E2-8432-6C60-5EC9CB9CBE24}"/>
+              </a:ext>
+            </a:extLst>
+          </p:cNvPr>
+          <p:cNvSpPr>
+            <a:spLocks noGrp="1"/>
+          </p:cNvSpPr>
+          <p:nvPr>
+            <p:ph type="title"/>
+          </p:nvPr>
+        </p:nvSpPr>
+        <p:spPr/>
+        <p:txBody>
+          <a:bodyPr/>
+          <a:lstStyle/>
+          <a:p>
+            <a:r>
+              <a:rPr lang="en-US" dirty="0"/>
+              <a:t>Exercise: Timer</a:t>
+            </a:r>
+          </a:p>
+        </p:txBody>
+      </p:sp>
+      <p:sp>
+        <p:nvSpPr>
+          <p:cNvPr id="3" name="Content Placeholder 2">
+            <a:extLst>
+              <a:ext uri="{FF2B5EF4-FFF2-40B4-BE49-F238E27FC236}">
+                <a16:creationId xmlns:a16="http://schemas.microsoft.com/office/drawing/2014/main" id="{29AA202B-F9F5-8A80-E6CF-1B85C5C3BD83}"/>
+              </a:ext>
+            </a:extLst>
+          </p:cNvPr>
+          <p:cNvSpPr>
+            <a:spLocks noGrp="1"/>
+          </p:cNvSpPr>
+          <p:nvPr>
+            <p:ph idx="1"/>
+          </p:nvPr>
+        </p:nvSpPr>
+        <p:spPr>
+          <a:xfrm>
+            <a:off x="576650" y="2351903"/>
+            <a:ext cx="11075772" cy="4399005"/>
+          </a:xfrm>
+        </p:spPr>
+        <p:txBody>
+          <a:bodyPr/>
+          <a:lstStyle/>
+          <a:p>
+            <a:r>
+              <a:rPr lang="en-US" dirty="0"/>
+              <a:t>In previous exercise, you have created a </a:t>
+            </a:r>
+            <a:r>
+              <a:rPr lang="en-US" dirty="0" err="1"/>
+              <a:t>SteamWorks</a:t>
+            </a:r>
+            <a:r>
+              <a:rPr lang="en-US" dirty="0"/>
+              <a:t> autonomous. Add a timer as the first state of the state machine to optionally delay 5 seconds before starting the autonomous routine.</a:t>
+            </a:r>
+          </a:p>
+          <a:p>
+            <a:r>
+              <a:rPr lang="en-US" dirty="0"/>
+              <a:t>In CmdAutoSteamWorksLeft.java, add a delay argument to its constructor .</a:t>
+            </a:r>
+          </a:p>
+          <a:p>
+            <a:r>
+              <a:rPr lang="en-US" dirty="0"/>
+              <a:t>In the constructor, also add code to create a timer.</a:t>
+            </a:r>
+          </a:p>
+          <a:p>
+            <a:r>
+              <a:rPr lang="en-US" dirty="0"/>
+              <a:t>In CmdAutoSteamWorksLeft.java, add a new START state to the state machine in </a:t>
+            </a:r>
+            <a:r>
+              <a:rPr lang="en-US" dirty="0" err="1"/>
+              <a:t>cmdPeriodic</a:t>
+            </a:r>
+            <a:r>
+              <a:rPr lang="en-US" dirty="0"/>
+              <a:t> that checks if the delay argument was zero. If so, set the state to start the autonomous, otherwise, start the timer for the specified delay time and start the autonomous after delay has expired.</a:t>
+            </a:r>
+          </a:p>
+          <a:p>
+            <a:r>
+              <a:rPr lang="en-US" dirty="0"/>
+              <a:t>In FrcAuto.java, change the code in </a:t>
+            </a:r>
+            <a:r>
+              <a:rPr lang="en-US" dirty="0" err="1"/>
+              <a:t>startMode</a:t>
+            </a:r>
+            <a:r>
+              <a:rPr lang="en-US" dirty="0"/>
+              <a:t> to pass a 5 second argument when creating </a:t>
+            </a:r>
+            <a:r>
+              <a:rPr lang="en-US" dirty="0" err="1"/>
+              <a:t>CmdAutoSteamWorksLeft</a:t>
+            </a:r>
+            <a:r>
+              <a:rPr lang="en-US" dirty="0"/>
+              <a:t>.</a:t>
+            </a:r>
+          </a:p>
+        </p:txBody>
+      </p:sp>
+    </p:spTree>
+    <p:extLst>
+      <p:ext uri="{BB962C8B-B14F-4D97-AF65-F5344CB8AC3E}">
+        <p14:creationId xmlns:p14="http://schemas.microsoft.com/office/powerpoint/2010/main" val="2656205325"/>
+      </p:ext>
+    </p:extLst>
+  </p:cSld>
+  <p:clrMapOvr>
+    <a:masterClrMapping/>
+  </p:clrMapOvr>
+</p:sld>
+</file>
+
+<file path=ppt/slides/slide12.xml><?xml version="1.0" encoding="utf-8"?>
+<p:sld xmlns:a="http://schemas.openxmlformats.org/drawingml/2006/main" xmlns:r="http://schemas.openxmlformats.org/officeDocument/2006/relationships" xmlns:p="http://schemas.openxmlformats.org/presentationml/2006/main">
+  <p:cSld>
+    <p:spTree>
+      <p:nvGrpSpPr>
+        <p:cNvPr id="1" name=""/>
+        <p:cNvGrpSpPr/>
+        <p:nvPr/>
+      </p:nvGrpSpPr>
+      <p:grpSpPr>
+        <a:xfrm>
+          <a:off x="0" y="0"/>
+          <a:ext cx="0" cy="0"/>
+          <a:chOff x="0" y="0"/>
+          <a:chExt cx="0" cy="0"/>
+        </a:xfrm>
+      </p:grpSpPr>
+      <p:sp>
+        <p:nvSpPr>
+          <p:cNvPr id="2" name="Title 1">
+            <a:extLst>
+              <a:ext uri="{FF2B5EF4-FFF2-40B4-BE49-F238E27FC236}">
+                <a16:creationId xmlns:a16="http://schemas.microsoft.com/office/drawing/2014/main" id="{F0CC69AE-8888-460A-9C25-3C0B9C277BEF}"/>
+              </a:ext>
+            </a:extLst>
+          </p:cNvPr>
+          <p:cNvSpPr>
+            <a:spLocks noGrp="1"/>
+          </p:cNvSpPr>
+          <p:nvPr>
+            <p:ph type="title"/>
+          </p:nvPr>
+        </p:nvSpPr>
+        <p:spPr>
+          <a:xfrm>
+            <a:off x="1154954" y="973668"/>
+            <a:ext cx="9440341" cy="706964"/>
+          </a:xfrm>
+        </p:spPr>
+        <p:txBody>
+          <a:bodyPr/>
+          <a:lstStyle/>
+          <a:p>
+            <a:r>
+              <a:rPr lang="en-US" dirty="0"/>
+              <a:t>Dashboard: Choice Menu</a:t>
+            </a:r>
+          </a:p>
+        </p:txBody>
+      </p:sp>
+      <p:sp>
+        <p:nvSpPr>
+          <p:cNvPr id="3" name="Content Placeholder 2">
+            <a:extLst>
+              <a:ext uri="{FF2B5EF4-FFF2-40B4-BE49-F238E27FC236}">
+                <a16:creationId xmlns:a16="http://schemas.microsoft.com/office/drawing/2014/main" id="{8FE38F20-2E17-41D8-8A5C-3250B31663F1}"/>
+              </a:ext>
+            </a:extLst>
+          </p:cNvPr>
+          <p:cNvSpPr>
+            <a:spLocks noGrp="1"/>
+          </p:cNvSpPr>
+          <p:nvPr>
+            <p:ph idx="1"/>
+          </p:nvPr>
+        </p:nvSpPr>
+        <p:spPr>
+          <a:xfrm>
+            <a:off x="557146" y="2231472"/>
+            <a:ext cx="11032342" cy="4626528"/>
+          </a:xfrm>
+        </p:spPr>
+        <p:txBody>
+          <a:bodyPr>
+            <a:normAutofit fontScale="70000" lnSpcReduction="20000"/>
+          </a:bodyPr>
+          <a:lstStyle/>
+          <a:p>
+            <a:r>
+              <a:rPr lang="en-US" dirty="0" err="1"/>
+              <a:t>FrcDashboard</a:t>
+            </a:r>
+            <a:r>
+              <a:rPr lang="en-US" dirty="0"/>
+              <a:t> can be used to display information on the Driver Station.</a:t>
+            </a:r>
+          </a:p>
+          <a:p>
+            <a:pPr lvl="1"/>
+            <a:r>
+              <a:rPr lang="en-US" dirty="0"/>
+              <a:t>Constructor: No need to instantiate it because </a:t>
+            </a:r>
+            <a:r>
+              <a:rPr lang="en-US" dirty="0" err="1"/>
+              <a:t>FrcDashboard</a:t>
+            </a:r>
+            <a:r>
+              <a:rPr lang="en-US" dirty="0"/>
+              <a:t> always exists when the robot program is loaded. Just need to call </a:t>
+            </a:r>
+            <a:r>
+              <a:rPr lang="en-US" dirty="0" err="1"/>
+              <a:t>FrcDashboard.getInstance</a:t>
+            </a:r>
+            <a:r>
+              <a:rPr lang="en-US" dirty="0"/>
+              <a:t>().</a:t>
+            </a:r>
+          </a:p>
+          <a:p>
+            <a:pPr lvl="1"/>
+            <a:r>
+              <a:rPr lang="en-US" dirty="0"/>
+              <a:t>Methods:</a:t>
+            </a:r>
+          </a:p>
+          <a:p>
+            <a:pPr lvl="2"/>
+            <a:r>
+              <a:rPr lang="en-US" dirty="0" err="1"/>
+              <a:t>displayPrintf</a:t>
+            </a:r>
+            <a:r>
+              <a:rPr lang="en-US" dirty="0"/>
+              <a:t> – Displays information on the 16-line “display panel”.</a:t>
+            </a:r>
+          </a:p>
+          <a:p>
+            <a:pPr lvl="2"/>
+            <a:r>
+              <a:rPr lang="en-US" dirty="0" err="1"/>
+              <a:t>clearDisplay</a:t>
+            </a:r>
+            <a:r>
+              <a:rPr lang="en-US" dirty="0"/>
+              <a:t> – Clears the display panel.</a:t>
+            </a:r>
+          </a:p>
+          <a:p>
+            <a:pPr lvl="2"/>
+            <a:r>
+              <a:rPr lang="en-US" dirty="0" err="1"/>
+              <a:t>putNumber</a:t>
+            </a:r>
+            <a:r>
+              <a:rPr lang="en-US" dirty="0"/>
+              <a:t> – Stores a number associated with the given key.</a:t>
+            </a:r>
+          </a:p>
+          <a:p>
+            <a:pPr lvl="2"/>
+            <a:r>
+              <a:rPr lang="en-US" dirty="0" err="1"/>
+              <a:t>putString</a:t>
+            </a:r>
+            <a:r>
+              <a:rPr lang="en-US" dirty="0"/>
+              <a:t> – Stores a string associated with the given key.</a:t>
+            </a:r>
+          </a:p>
+          <a:p>
+            <a:pPr lvl="2"/>
+            <a:r>
+              <a:rPr lang="en-US" dirty="0" err="1"/>
+              <a:t>putBoolean</a:t>
+            </a:r>
+            <a:r>
+              <a:rPr lang="en-US" dirty="0"/>
+              <a:t> – Stores a Boolean state associated with the given key.</a:t>
+            </a:r>
+          </a:p>
+          <a:p>
+            <a:pPr lvl="2"/>
+            <a:r>
+              <a:rPr lang="en-US" dirty="0" err="1"/>
+              <a:t>putData</a:t>
+            </a:r>
+            <a:r>
+              <a:rPr lang="en-US" dirty="0"/>
+              <a:t> – Stores a data object associated with the given key.</a:t>
+            </a:r>
+          </a:p>
+          <a:p>
+            <a:pPr lvl="2"/>
+            <a:r>
+              <a:rPr lang="en-US" dirty="0"/>
+              <a:t>get* - get data associated with the given key from the Driver Station.</a:t>
+            </a:r>
+          </a:p>
+          <a:p>
+            <a:r>
+              <a:rPr lang="en-US" dirty="0" err="1"/>
+              <a:t>FrcChoiceMenu</a:t>
+            </a:r>
+            <a:r>
+              <a:rPr lang="en-US" dirty="0"/>
+              <a:t> is used to present choices to the drivers to select match options on the Driver Station.</a:t>
+            </a:r>
+          </a:p>
+          <a:p>
+            <a:pPr lvl="1"/>
+            <a:r>
+              <a:rPr lang="en-US" dirty="0"/>
+              <a:t>Constructor: </a:t>
+            </a:r>
+            <a:r>
+              <a:rPr lang="en-US" b="0" dirty="0" err="1">
+                <a:solidFill>
+                  <a:srgbClr val="DCDCAA"/>
+                </a:solidFill>
+                <a:effectLst/>
+                <a:latin typeface="Consolas" panose="020B0609020204030204" pitchFamily="49" charset="0"/>
+              </a:rPr>
+              <a:t>FrcChoiceMenu</a:t>
+            </a:r>
+            <a:r>
+              <a:rPr lang="en-US" b="0" dirty="0">
+                <a:solidFill>
+                  <a:srgbClr val="D4D4D4"/>
+                </a:solidFill>
+                <a:effectLst/>
+                <a:latin typeface="Consolas" panose="020B0609020204030204" pitchFamily="49" charset="0"/>
+              </a:rPr>
+              <a:t>(</a:t>
+            </a:r>
+            <a:r>
+              <a:rPr lang="en-US" b="0" dirty="0">
+                <a:solidFill>
+                  <a:srgbClr val="4EC9B0"/>
+                </a:solidFill>
+                <a:effectLst/>
+                <a:latin typeface="Consolas" panose="020B0609020204030204" pitchFamily="49" charset="0"/>
+              </a:rPr>
+              <a:t>String</a:t>
+            </a:r>
+            <a:r>
+              <a:rPr lang="en-US" b="0" dirty="0">
+                <a:solidFill>
+                  <a:srgbClr val="D4D4D4"/>
+                </a:solidFill>
+                <a:effectLst/>
+                <a:latin typeface="Consolas" panose="020B0609020204030204" pitchFamily="49" charset="0"/>
+              </a:rPr>
+              <a:t> </a:t>
+            </a:r>
+            <a:r>
+              <a:rPr lang="en-US" b="0" dirty="0" err="1">
+                <a:solidFill>
+                  <a:srgbClr val="9CDCFE"/>
+                </a:solidFill>
+                <a:effectLst/>
+                <a:latin typeface="Consolas" panose="020B0609020204030204" pitchFamily="49" charset="0"/>
+              </a:rPr>
+              <a:t>menuTitle</a:t>
+            </a:r>
+            <a:r>
+              <a:rPr lang="en-US" b="0" dirty="0">
+                <a:solidFill>
+                  <a:srgbClr val="D4D4D4"/>
+                </a:solidFill>
+                <a:effectLst/>
+                <a:latin typeface="Consolas" panose="020B0609020204030204" pitchFamily="49" charset="0"/>
+              </a:rPr>
+              <a:t>)</a:t>
+            </a:r>
+            <a:endParaRPr lang="en-US" dirty="0"/>
+          </a:p>
+          <a:p>
+            <a:pPr lvl="1"/>
+            <a:r>
+              <a:rPr lang="en-US" dirty="0"/>
+              <a:t>Methods:</a:t>
+            </a:r>
+          </a:p>
+          <a:p>
+            <a:pPr lvl="2"/>
+            <a:r>
+              <a:rPr lang="en-US" dirty="0" err="1"/>
+              <a:t>addChoice</a:t>
+            </a:r>
+            <a:r>
+              <a:rPr lang="en-US" dirty="0"/>
+              <a:t> – Adds a choice to the choice menu.</a:t>
+            </a:r>
+          </a:p>
+          <a:p>
+            <a:pPr lvl="2"/>
+            <a:r>
+              <a:rPr lang="en-US" dirty="0" err="1"/>
+              <a:t>getCurrentChoiceObject</a:t>
+            </a:r>
+            <a:r>
+              <a:rPr lang="en-US" dirty="0"/>
+              <a:t> – Gets the current choice data object.</a:t>
+            </a:r>
+          </a:p>
+          <a:p>
+            <a:pPr lvl="2"/>
+            <a:r>
+              <a:rPr lang="en-US" dirty="0" err="1"/>
+              <a:t>getCurrentChoiceText</a:t>
+            </a:r>
+            <a:r>
+              <a:rPr lang="en-US" dirty="0"/>
+              <a:t> – Gets the current choice text.</a:t>
+            </a:r>
+          </a:p>
+          <a:p>
+            <a:pPr lvl="2"/>
+            <a:r>
+              <a:rPr lang="en-US" dirty="0" err="1"/>
+              <a:t>getTitle</a:t>
+            </a:r>
+            <a:r>
+              <a:rPr lang="en-US" dirty="0"/>
+              <a:t> – Gets the menu title</a:t>
+            </a:r>
+          </a:p>
+        </p:txBody>
+      </p:sp>
+    </p:spTree>
+    <p:extLst>
+      <p:ext uri="{BB962C8B-B14F-4D97-AF65-F5344CB8AC3E}">
+        <p14:creationId xmlns:p14="http://schemas.microsoft.com/office/powerpoint/2010/main" val="892151892"/>
+      </p:ext>
+    </p:extLst>
+  </p:cSld>
+  <p:clrMapOvr>
+    <a:masterClrMapping/>
+  </p:clrMapOvr>
+</p:sld>
+</file>
+
+<file path=ppt/slides/slide13.xml><?xml version="1.0" encoding="utf-8"?>
+<p:sld xmlns:a="http://schemas.openxmlformats.org/drawingml/2006/main" xmlns:r="http://schemas.openxmlformats.org/officeDocument/2006/relationships" xmlns:p="http://schemas.openxmlformats.org/presentationml/2006/main">
+  <p:cSld>
+    <p:spTree>
+      <p:nvGrpSpPr>
+        <p:cNvPr id="1" name=""/>
+        <p:cNvGrpSpPr/>
+        <p:nvPr/>
+      </p:nvGrpSpPr>
+      <p:grpSpPr>
+        <a:xfrm>
+          <a:off x="0" y="0"/>
+          <a:ext cx="0" cy="0"/>
+          <a:chOff x="0" y="0"/>
+          <a:chExt cx="0" cy="0"/>
+        </a:xfrm>
+      </p:grpSpPr>
+      <p:sp>
+        <p:nvSpPr>
+          <p:cNvPr id="2" name="Title 1">
+            <a:extLst>
+              <a:ext uri="{FF2B5EF4-FFF2-40B4-BE49-F238E27FC236}">
+                <a16:creationId xmlns:a16="http://schemas.microsoft.com/office/drawing/2014/main" id="{EAA4390D-3BFD-4233-ABD6-147E253EB68A}"/>
+              </a:ext>
+            </a:extLst>
+          </p:cNvPr>
+          <p:cNvSpPr>
+            <a:spLocks noGrp="1"/>
+          </p:cNvSpPr>
+          <p:nvPr>
+            <p:ph type="title"/>
+          </p:nvPr>
+        </p:nvSpPr>
+        <p:spPr>
+          <a:xfrm>
+            <a:off x="478172" y="973668"/>
+            <a:ext cx="11174136" cy="706964"/>
+          </a:xfrm>
+        </p:spPr>
+        <p:txBody>
+          <a:bodyPr/>
+          <a:lstStyle/>
+          <a:p>
+            <a:r>
+              <a:rPr lang="en-US" dirty="0"/>
+              <a:t>Exercise: Add </a:t>
+            </a:r>
+            <a:r>
+              <a:rPr lang="en-US" dirty="0" err="1"/>
+              <a:t>SteamWorks</a:t>
+            </a:r>
+            <a:r>
+              <a:rPr lang="en-US" dirty="0"/>
+              <a:t> Auto to Auto Strategies</a:t>
+            </a:r>
+          </a:p>
+        </p:txBody>
+      </p:sp>
+      <p:sp>
+        <p:nvSpPr>
+          <p:cNvPr id="3" name="Content Placeholder 2">
+            <a:extLst>
+              <a:ext uri="{FF2B5EF4-FFF2-40B4-BE49-F238E27FC236}">
+                <a16:creationId xmlns:a16="http://schemas.microsoft.com/office/drawing/2014/main" id="{F53B54C5-5556-4DA6-8E0E-8EADBD95B226}"/>
+              </a:ext>
+            </a:extLst>
+          </p:cNvPr>
+          <p:cNvSpPr>
+            <a:spLocks noGrp="1"/>
+          </p:cNvSpPr>
+          <p:nvPr>
+            <p:ph idx="1"/>
+          </p:nvPr>
+        </p:nvSpPr>
+        <p:spPr>
+          <a:xfrm>
+            <a:off x="531628" y="2275367"/>
+            <a:ext cx="11083379" cy="4491193"/>
+          </a:xfrm>
+        </p:spPr>
+        <p:txBody>
+          <a:bodyPr>
+            <a:normAutofit fontScale="92500" lnSpcReduction="10000"/>
+          </a:bodyPr>
+          <a:lstStyle/>
+          <a:p>
+            <a:r>
+              <a:rPr lang="en-US" dirty="0"/>
+              <a:t>Add </a:t>
+            </a:r>
+            <a:r>
+              <a:rPr lang="en-US" dirty="0" err="1"/>
+              <a:t>SteamWorks</a:t>
+            </a:r>
+            <a:r>
+              <a:rPr lang="en-US" dirty="0"/>
+              <a:t> auto as one of the </a:t>
+            </a:r>
+            <a:r>
+              <a:rPr lang="en-US" dirty="0" err="1"/>
+              <a:t>AutoChoices</a:t>
+            </a:r>
+            <a:r>
+              <a:rPr lang="en-US" dirty="0"/>
+              <a:t>, connect the </a:t>
+            </a:r>
+            <a:r>
+              <a:rPr lang="en-US" dirty="0" err="1"/>
+              <a:t>startDelay</a:t>
+            </a:r>
+            <a:r>
+              <a:rPr lang="en-US" dirty="0"/>
+              <a:t> in </a:t>
+            </a:r>
+            <a:r>
+              <a:rPr lang="en-US" dirty="0" err="1"/>
+              <a:t>AutoChoices</a:t>
+            </a:r>
+            <a:r>
+              <a:rPr lang="en-US" dirty="0"/>
+              <a:t> to the delay argument in </a:t>
+            </a:r>
+            <a:r>
+              <a:rPr lang="en-US" dirty="0" err="1"/>
+              <a:t>CmdAutoSteamWorksLeft</a:t>
+            </a:r>
+            <a:r>
+              <a:rPr lang="en-US" dirty="0"/>
+              <a:t> and add a new field </a:t>
+            </a:r>
+            <a:r>
+              <a:rPr lang="en-US" dirty="0" err="1"/>
+              <a:t>neutralZoneDistance</a:t>
+            </a:r>
+            <a:r>
+              <a:rPr lang="en-US" dirty="0"/>
+              <a:t> in </a:t>
+            </a:r>
+            <a:r>
+              <a:rPr lang="en-US" dirty="0" err="1"/>
+              <a:t>AutoChoices</a:t>
+            </a:r>
+            <a:r>
+              <a:rPr lang="en-US" dirty="0"/>
+              <a:t>.</a:t>
+            </a:r>
+          </a:p>
+          <a:p>
+            <a:pPr lvl="1"/>
+            <a:r>
+              <a:rPr lang="en-US" dirty="0"/>
+              <a:t>In FrcAuto.java, add code to the </a:t>
+            </a:r>
+            <a:r>
+              <a:rPr lang="en-US" dirty="0" err="1"/>
+              <a:t>AutoChoices</a:t>
+            </a:r>
+            <a:r>
+              <a:rPr lang="en-US" dirty="0"/>
+              <a:t> constructor to add the new AUTO_STEAMWORKS_LEFT choice.</a:t>
+            </a:r>
+          </a:p>
+          <a:p>
+            <a:pPr lvl="1"/>
+            <a:r>
+              <a:rPr lang="en-US" dirty="0"/>
+              <a:t>Change code in </a:t>
+            </a:r>
+            <a:r>
+              <a:rPr lang="en-US" dirty="0" err="1"/>
+              <a:t>startMode</a:t>
+            </a:r>
+            <a:r>
+              <a:rPr lang="en-US" dirty="0"/>
+              <a:t> to pass </a:t>
+            </a:r>
+            <a:r>
+              <a:rPr lang="en-US" dirty="0" err="1"/>
+              <a:t>startDelay</a:t>
+            </a:r>
+            <a:r>
+              <a:rPr lang="en-US" dirty="0"/>
+              <a:t> as the delay argument in the construction of </a:t>
+            </a:r>
+            <a:r>
+              <a:rPr lang="en-US" dirty="0" err="1"/>
+              <a:t>CmdAutoStreamWorksLeft</a:t>
+            </a:r>
+            <a:r>
+              <a:rPr lang="en-US" dirty="0"/>
+              <a:t>.</a:t>
+            </a:r>
+          </a:p>
+          <a:p>
+            <a:pPr lvl="1"/>
+            <a:r>
+              <a:rPr lang="en-US" dirty="0"/>
+              <a:t>Add a new String field variable DBKEY_AUTO_NEUTRAL_ZONE_DISTANCE and set it to “Auto/</a:t>
+            </a:r>
+            <a:r>
+              <a:rPr lang="en-US" dirty="0" err="1"/>
+              <a:t>NeutralZoneDistance</a:t>
+            </a:r>
+            <a:r>
+              <a:rPr lang="en-US" dirty="0"/>
+              <a:t>”.</a:t>
+            </a:r>
+          </a:p>
+          <a:p>
+            <a:pPr lvl="1"/>
+            <a:r>
+              <a:rPr lang="en-US" dirty="0"/>
+              <a:t>Add code to the </a:t>
+            </a:r>
+            <a:r>
+              <a:rPr lang="en-US" dirty="0" err="1"/>
+              <a:t>AutoChoices</a:t>
+            </a:r>
+            <a:r>
+              <a:rPr lang="en-US" dirty="0"/>
+              <a:t> constructor to add the new number field named DBKEY_AUTO_NEUTRAL_ZONE_DISTANCE with a default value of 320 inches (Hint: </a:t>
+            </a:r>
+            <a:r>
+              <a:rPr lang="en-US" dirty="0" err="1"/>
+              <a:t>userChoices.addNumber</a:t>
+            </a:r>
+            <a:r>
+              <a:rPr lang="en-US" dirty="0"/>
+              <a:t>).</a:t>
+            </a:r>
+          </a:p>
+          <a:p>
+            <a:pPr lvl="1"/>
+            <a:r>
+              <a:rPr lang="en-US" dirty="0"/>
+              <a:t>Add a new method </a:t>
+            </a:r>
+            <a:r>
+              <a:rPr lang="en-US" dirty="0" err="1"/>
+              <a:t>getNeutralZoneDistance</a:t>
+            </a:r>
+            <a:r>
+              <a:rPr lang="en-US" dirty="0"/>
+              <a:t> to the </a:t>
+            </a:r>
+            <a:r>
+              <a:rPr lang="en-US" dirty="0" err="1"/>
+              <a:t>AutoChoices</a:t>
+            </a:r>
+            <a:r>
+              <a:rPr lang="en-US" dirty="0"/>
+              <a:t> class returning the value of the field.</a:t>
+            </a:r>
+          </a:p>
+          <a:p>
+            <a:pPr lvl="1"/>
+            <a:r>
+              <a:rPr lang="en-US" dirty="0"/>
+              <a:t>In CmdAutoSteamWorksLeft.java, add a new argument </a:t>
+            </a:r>
+            <a:r>
+              <a:rPr lang="en-US" dirty="0" err="1"/>
+              <a:t>neutralZoneDistance</a:t>
+            </a:r>
+            <a:r>
+              <a:rPr lang="en-US" dirty="0"/>
+              <a:t> in its constructor.</a:t>
+            </a:r>
+          </a:p>
+          <a:p>
+            <a:pPr lvl="1"/>
+            <a:r>
+              <a:rPr lang="en-US" dirty="0"/>
+              <a:t>Change code in </a:t>
+            </a:r>
+            <a:r>
+              <a:rPr lang="en-US" dirty="0" err="1"/>
+              <a:t>cmdPeriodic</a:t>
+            </a:r>
+            <a:r>
+              <a:rPr lang="en-US" dirty="0"/>
+              <a:t> to use the new </a:t>
+            </a:r>
+            <a:r>
+              <a:rPr lang="en-US" dirty="0" err="1"/>
+              <a:t>neutralZoneDistance</a:t>
+            </a:r>
+            <a:r>
+              <a:rPr lang="en-US" dirty="0"/>
+              <a:t> argument to navigate the robot out to the neutral zone.</a:t>
+            </a:r>
+          </a:p>
+          <a:p>
+            <a:pPr lvl="1"/>
+            <a:r>
+              <a:rPr lang="en-US" dirty="0"/>
+              <a:t>In FrcAuto.java, change code in </a:t>
+            </a:r>
+            <a:r>
+              <a:rPr lang="en-US" dirty="0" err="1"/>
+              <a:t>startMode</a:t>
+            </a:r>
+            <a:r>
+              <a:rPr lang="en-US" dirty="0"/>
+              <a:t> to add the </a:t>
+            </a:r>
+            <a:r>
+              <a:rPr lang="en-US" dirty="0" err="1"/>
+              <a:t>neutralZoneDistance</a:t>
+            </a:r>
+            <a:r>
+              <a:rPr lang="en-US" dirty="0"/>
+              <a:t> from </a:t>
+            </a:r>
+            <a:r>
+              <a:rPr lang="en-US" dirty="0" err="1"/>
+              <a:t>AutoChoices</a:t>
+            </a:r>
+            <a:r>
+              <a:rPr lang="en-US" dirty="0"/>
+              <a:t> as the new argument when constructing </a:t>
+            </a:r>
+            <a:r>
+              <a:rPr lang="en-US" dirty="0" err="1"/>
+              <a:t>CmdAutoSteamWorksLeft</a:t>
+            </a:r>
+            <a:r>
+              <a:rPr lang="en-US" dirty="0"/>
+              <a:t>.</a:t>
+            </a:r>
+          </a:p>
+        </p:txBody>
+      </p:sp>
+    </p:spTree>
+    <p:extLst>
+      <p:ext uri="{BB962C8B-B14F-4D97-AF65-F5344CB8AC3E}">
+        <p14:creationId xmlns:p14="http://schemas.microsoft.com/office/powerpoint/2010/main" val="3047232960"/>
+      </p:ext>
+    </p:extLst>
+  </p:cSld>
+  <p:clrMapOvr>
+    <a:masterClrMapping/>
+  </p:clrMapOvr>
+</p:sld>
+</file>
+
+<file path=ppt/slides/slide14.xml><?xml version="1.0" encoding="utf-8"?>
+<p:sld xmlns:a="http://schemas.openxmlformats.org/drawingml/2006/main" xmlns:r="http://schemas.openxmlformats.org/officeDocument/2006/relationships" xmlns:p="http://schemas.openxmlformats.org/presentationml/2006/main">
+  <p:cSld>
+    <p:spTree>
+      <p:nvGrpSpPr>
+        <p:cNvPr id="1" name=""/>
+        <p:cNvGrpSpPr/>
+        <p:nvPr/>
+      </p:nvGrpSpPr>
+      <p:grpSpPr>
+        <a:xfrm>
+          <a:off x="0" y="0"/>
+          <a:ext cx="0" cy="0"/>
+          <a:chOff x="0" y="0"/>
+          <a:chExt cx="0" cy="0"/>
+        </a:xfrm>
+      </p:grpSpPr>
+      <p:sp>
+        <p:nvSpPr>
+          <p:cNvPr id="2" name="Title 1">
+            <a:extLst>
+              <a:ext uri="{FF2B5EF4-FFF2-40B4-BE49-F238E27FC236}">
+                <a16:creationId xmlns:a16="http://schemas.microsoft.com/office/drawing/2014/main" id="{5DBDB647-6AC3-45C1-A1D4-3B298AEE5877}"/>
+              </a:ext>
+            </a:extLst>
+          </p:cNvPr>
+          <p:cNvSpPr>
+            <a:spLocks noGrp="1"/>
+          </p:cNvSpPr>
+          <p:nvPr>
+            <p:ph type="title"/>
+          </p:nvPr>
+        </p:nvSpPr>
         <p:spPr>
           <a:xfrm>
             <a:off x="922789" y="973668"/>
@@ -14160,34 +15677,18 @@
             <a:pPr lvl="1"/>
             <a:r>
               <a:rPr lang="en-US" dirty="0"/>
-              <a:t>Exercise: </a:t>
+              <a:t>Timer</a:t>
+            </a:r>
+          </a:p>
+          <a:p>
+            <a:pPr lvl="1"/>
+            <a:r>
+              <a:rPr lang="en-US" dirty="0"/>
+              <a:t>Dashboard: </a:t>
             </a:r>
             <a:r>
               <a:rPr lang="en-US" dirty="0" err="1"/>
-              <a:t>Steamworks</a:t>
-            </a:r>
-            <a:r>
-              <a:rPr lang="en-US" dirty="0"/>
-              <a:t> Autonomous</a:t>
-            </a:r>
-          </a:p>
-          <a:p>
-            <a:pPr lvl="1"/>
-            <a:r>
-              <a:rPr lang="en-US" dirty="0"/>
-              <a:t>Exercise: </a:t>
-            </a:r>
-            <a:r>
-              <a:rPr lang="en-US" dirty="0" err="1"/>
-              <a:t>ChargedUp</a:t>
-            </a:r>
-            <a:r>
-              <a:rPr lang="en-US" dirty="0"/>
-              <a:t> </a:t>
-            </a:r>
-            <a:r>
-              <a:rPr lang="en-US" dirty="0" err="1"/>
-              <a:t>AutoScore</a:t>
+              <a:t>ChoiceMenu</a:t>
             </a:r>
             <a:endParaRPr lang="en-US" dirty="0"/>
           </a:p>
@@ -17387,7 +18888,7 @@
             </a:r>
             <a:r>
               <a:rPr lang="en-US" dirty="0" err="1"/>
-              <a:t>AutoCommand</a:t>
+              <a:t>RobotCommand</a:t>
             </a:r>
             <a:r>
               <a:rPr lang="en-US" dirty="0"/>
@@ -17847,7 +19348,15 @@
             </a:r>
             <a:r>
               <a:rPr lang="en-US" dirty="0"/>
-              <a:t> to create a pneumatic gear deployer.</a:t>
+              <a:t> to create a pneumatic gear deployer (</a:t>
+            </a:r>
+            <a:r>
+              <a:rPr lang="en-US" dirty="0" err="1"/>
+              <a:t>FrcPneumatics</a:t>
+            </a:r>
+            <a:r>
+              <a:rPr lang="en-US" dirty="0"/>
+              <a:t>).</a:t>
             </a:r>
           </a:p>
           <a:p>
@@ -17858,7 +19367,7 @@
             </a:r>
             <a:r>
               <a:rPr lang="en-US" dirty="0" err="1"/>
-              <a:t>RobotCommand</a:t>
+              <a:t>TrcRobot.RobotCommand</a:t>
             </a:r>
             <a:r>
               <a:rPr lang="en-US" dirty="0"/>

</xml_diff>